<commit_message>
Docs: introduction to Rayleigh fit configs
Add some explanations for Rayleigh fit configs.
</commit_message>
<xml_diff>
--- a/doc/Picasso_Rayleigh_fit_algorithm.pptx
+++ b/doc/Picasso_Rayleigh_fit_algorithm.pptx
@@ -208,7 +208,7 @@
           <a:p>
             <a:fld id="{698CAEF6-294A-4639-B09D-0660E9322DC7}" type="datetimeFigureOut">
               <a:rPr lang="en-US" smtClean="0"/>
-              <a:t>6/18/2021</a:t>
+              <a:t>6/20/2021</a:t>
             </a:fld>
             <a:endParaRPr lang="en-US"/>
           </a:p>
@@ -2096,7 +2096,7 @@
           <a:p>
             <a:fld id="{032BC651-58A4-4B40-86C1-2DC6DC338FAF}" type="datetimeFigureOut">
               <a:rPr lang="en-US" smtClean="0"/>
-              <a:t>6/18/2021</a:t>
+              <a:t>6/20/2021</a:t>
             </a:fld>
             <a:endParaRPr lang="en-US"/>
           </a:p>
@@ -4647,8 +4647,8 @@
             </a:p>
           </p:txBody>
         </p:sp>
-        <mc:AlternateContent xmlns:mc="http://schemas.openxmlformats.org/markup-compatibility/2006">
-          <mc:Choice xmlns:a14="http://schemas.microsoft.com/office/drawing/2010/main" Requires="a14">
+        <mc:AlternateContent xmlns:mc="http://schemas.openxmlformats.org/markup-compatibility/2006" xmlns:a14="http://schemas.microsoft.com/office/drawing/2010/main">
+          <mc:Choice Requires="a14">
             <p:sp>
               <p:nvSpPr>
                 <p:cNvPr id="10" name="文本框 9">
@@ -4690,6 +4690,7 @@
                 </a:bodyPr>
                 <a:lstStyle/>
                 <a:p>
+                  <a:pPr/>
                   <a14:m>
                     <m:oMathPara xmlns:m="http://schemas.openxmlformats.org/officeDocument/2006/math">
                       <m:oMathParaPr>
@@ -5061,7 +5062,7 @@
               </p:txBody>
             </p:sp>
           </mc:Choice>
-          <mc:Fallback>
+          <mc:Fallback xmlns="">
             <p:sp>
               <p:nvSpPr>
                 <p:cNvPr id="10" name="文本框 9">
@@ -5107,8 +5108,8 @@
           </mc:Fallback>
         </mc:AlternateContent>
       </p:grpSp>
-      <mc:AlternateContent xmlns:mc="http://schemas.openxmlformats.org/markup-compatibility/2006">
-        <mc:Choice xmlns:a14="http://schemas.microsoft.com/office/drawing/2010/main" Requires="a14">
+      <mc:AlternateContent xmlns:mc="http://schemas.openxmlformats.org/markup-compatibility/2006" xmlns:a14="http://schemas.microsoft.com/office/drawing/2010/main">
+        <mc:Choice Requires="a14">
           <p:sp>
             <p:nvSpPr>
               <p:cNvPr id="11" name="文本框 10">
@@ -5264,7 +5265,7 @@
             </p:txBody>
           </p:sp>
         </mc:Choice>
-        <mc:Fallback>
+        <mc:Fallback xmlns="">
           <p:sp>
             <p:nvSpPr>
               <p:cNvPr id="11" name="文本框 10">
@@ -6357,7 +6358,7 @@
       </p:par>
     </p:tnLst>
     <p:bldLst>
-      <p:bldP spid="12" grpId="0"/>
+      <p:bldP spid="12" grpId="0" animBg="1"/>
     </p:bldLst>
   </p:timing>
 </p:sld>
@@ -6601,8 +6602,8 @@
             </a:p>
           </p:txBody>
         </p:sp>
-        <mc:AlternateContent xmlns:mc="http://schemas.openxmlformats.org/markup-compatibility/2006">
-          <mc:Choice xmlns:a14="http://schemas.microsoft.com/office/drawing/2010/main" Requires="a14">
+        <mc:AlternateContent xmlns:mc="http://schemas.openxmlformats.org/markup-compatibility/2006" xmlns:a14="http://schemas.microsoft.com/office/drawing/2010/main">
+          <mc:Choice Requires="a14">
             <p:sp>
               <p:nvSpPr>
                 <p:cNvPr id="8" name="文本框 7">
@@ -6644,6 +6645,7 @@
                 </a:bodyPr>
                 <a:lstStyle/>
                 <a:p>
+                  <a:pPr/>
                   <a14:m>
                     <m:oMathPara xmlns:m="http://schemas.openxmlformats.org/officeDocument/2006/math">
                       <m:oMathParaPr>
@@ -7015,7 +7017,7 @@
               </p:txBody>
             </p:sp>
           </mc:Choice>
-          <mc:Fallback>
+          <mc:Fallback xmlns="">
             <p:sp>
               <p:nvSpPr>
                 <p:cNvPr id="8" name="文本框 7">
@@ -7061,8 +7063,8 @@
           </mc:Fallback>
         </mc:AlternateContent>
       </p:grpSp>
-      <mc:AlternateContent xmlns:mc="http://schemas.openxmlformats.org/markup-compatibility/2006">
-        <mc:Choice xmlns:a14="http://schemas.microsoft.com/office/drawing/2010/main" Requires="a14">
+      <mc:AlternateContent xmlns:mc="http://schemas.openxmlformats.org/markup-compatibility/2006" xmlns:a14="http://schemas.microsoft.com/office/drawing/2010/main">
+        <mc:Choice Requires="a14">
           <p:sp>
             <p:nvSpPr>
               <p:cNvPr id="9" name="文本框 8">
@@ -7218,7 +7220,7 @@
             </p:txBody>
           </p:sp>
         </mc:Choice>
-        <mc:Fallback>
+        <mc:Fallback xmlns="">
           <p:sp>
             <p:nvSpPr>
               <p:cNvPr id="9" name="文本框 8">
@@ -7313,8 +7315,8 @@
           </a:p>
         </p:txBody>
       </p:sp>
-      <mc:AlternateContent xmlns:mc="http://schemas.openxmlformats.org/markup-compatibility/2006">
-        <mc:Choice xmlns:a14="http://schemas.microsoft.com/office/drawing/2010/main" Requires="a14">
+      <mc:AlternateContent xmlns:mc="http://schemas.openxmlformats.org/markup-compatibility/2006" xmlns:a14="http://schemas.microsoft.com/office/drawing/2010/main">
+        <mc:Choice Requires="a14">
           <p:sp>
             <p:nvSpPr>
               <p:cNvPr id="11" name="TextBox 3">
@@ -7800,7 +7802,7 @@
             </p:txBody>
           </p:sp>
         </mc:Choice>
-        <mc:Fallback>
+        <mc:Fallback xmlns="">
           <p:sp>
             <p:nvSpPr>
               <p:cNvPr id="11" name="TextBox 3">
@@ -8072,125 +8074,148 @@
                           <m:t>&lt;</m:t>
                         </m:r>
                         <m:r>
-                          <m:rPr>
-                            <m:sty m:val="p"/>
-                          </m:rPr>
+                          <a:rPr lang="en-US" sz="1100" b="0" i="1" smtClean="0">
+                            <a:latin typeface="Cambria Math" panose="02040503050406030204" pitchFamily="18" charset="0"/>
+                          </a:rPr>
+                          <m:t>𝑘</m:t>
+                        </m:r>
+                        <m:r>
                           <a:rPr lang="en-US" sz="1100" b="0" i="0" smtClean="0">
                             <a:latin typeface="Cambria Math" panose="02040503050406030204" pitchFamily="18" charset="0"/>
                           </a:rPr>
-                          <m:t>Δ</m:t>
+                          <m:t>∗</m:t>
                         </m:r>
-                        <m:sSub>
-                          <m:sSubPr>
+                        <m:d>
+                          <m:dPr>
                             <m:ctrlPr>
-                              <a:rPr lang="en-US" sz="1100" i="1">
+                              <a:rPr lang="en-US" sz="1100" b="0" i="0" smtClean="0">
                                 <a:latin typeface="Cambria Math" panose="02040503050406030204" pitchFamily="18" charset="0"/>
                               </a:rPr>
                             </m:ctrlPr>
-                          </m:sSubPr>
+                          </m:dPr>
                           <m:e>
                             <m:r>
-                              <a:rPr lang="en-US" sz="1100" i="1">
+                              <m:rPr>
+                                <m:sty m:val="p"/>
+                              </m:rPr>
+                              <a:rPr lang="en-US" sz="1100">
                                 <a:latin typeface="Cambria Math" panose="02040503050406030204" pitchFamily="18" charset="0"/>
                               </a:rPr>
-                              <m:t>𝑔</m:t>
+                              <m:t>Δ</m:t>
                             </m:r>
-                          </m:e>
-                          <m:sub>
-                            <m:sSup>
-                              <m:sSupPr>
+                            <m:sSub>
+                              <m:sSubPr>
                                 <m:ctrlPr>
                                   <a:rPr lang="en-US" sz="1100" i="1">
                                     <a:latin typeface="Cambria Math" panose="02040503050406030204" pitchFamily="18" charset="0"/>
                                   </a:rPr>
                                 </m:ctrlPr>
-                              </m:sSupPr>
+                              </m:sSubPr>
                               <m:e>
                                 <m:r>
                                   <a:rPr lang="en-US" sz="1100" i="1">
                                     <a:latin typeface="Cambria Math" panose="02040503050406030204" pitchFamily="18" charset="0"/>
                                   </a:rPr>
-                                  <m:t>𝑃</m:t>
+                                  <m:t>𝑔</m:t>
                                 </m:r>
                               </m:e>
-                              <m:sup>
-                                <m:r>
-                                  <a:rPr lang="en-US" sz="1100" i="1">
-                                    <a:latin typeface="Cambria Math" panose="02040503050406030204" pitchFamily="18" charset="0"/>
-                                  </a:rPr>
-                                  <m:t>𝑛𝑜𝑟𝑚</m:t>
-                                </m:r>
-                              </m:sup>
-                            </m:sSup>
-                          </m:sub>
-                        </m:sSub>
-                        <m:r>
-                          <a:rPr lang="en-US" sz="1100" b="0" i="1" smtClean="0">
-                            <a:latin typeface="Cambria Math" panose="02040503050406030204" pitchFamily="18" charset="0"/>
-                          </a:rPr>
-                          <m:t>+</m:t>
-                        </m:r>
-                        <m:r>
-                          <m:rPr>
-                            <m:sty m:val="p"/>
-                          </m:rPr>
-                          <a:rPr lang="en-US" sz="1100" b="0" i="0" smtClean="0">
-                            <a:latin typeface="Cambria Math" panose="02040503050406030204" pitchFamily="18" charset="0"/>
-                          </a:rPr>
-                          <m:t>Δ</m:t>
-                        </m:r>
-                        <m:sSub>
-                          <m:sSubPr>
-                            <m:ctrlPr>
-                              <a:rPr lang="en-US" sz="1100" i="1">
-                                <a:latin typeface="Cambria Math" panose="02040503050406030204" pitchFamily="18" charset="0"/>
-                              </a:rPr>
-                            </m:ctrlPr>
-                          </m:sSubPr>
-                          <m:e>
+                              <m:sub>
+                                <m:sSup>
+                                  <m:sSupPr>
+                                    <m:ctrlPr>
+                                      <a:rPr lang="en-US" sz="1100" i="1">
+                                        <a:latin typeface="Cambria Math" panose="02040503050406030204" pitchFamily="18" charset="0"/>
+                                      </a:rPr>
+                                    </m:ctrlPr>
+                                  </m:sSupPr>
+                                  <m:e>
+                                    <m:r>
+                                      <a:rPr lang="en-US" sz="1100" i="1">
+                                        <a:latin typeface="Cambria Math" panose="02040503050406030204" pitchFamily="18" charset="0"/>
+                                      </a:rPr>
+                                      <m:t>𝑃</m:t>
+                                    </m:r>
+                                  </m:e>
+                                  <m:sup>
+                                    <m:r>
+                                      <a:rPr lang="en-US" sz="1100" i="1">
+                                        <a:latin typeface="Cambria Math" panose="02040503050406030204" pitchFamily="18" charset="0"/>
+                                      </a:rPr>
+                                      <m:t>𝑛𝑜𝑟𝑚</m:t>
+                                    </m:r>
+                                  </m:sup>
+                                </m:sSup>
+                              </m:sub>
+                            </m:sSub>
                             <m:r>
                               <a:rPr lang="en-US" sz="1100" i="1">
                                 <a:latin typeface="Cambria Math" panose="02040503050406030204" pitchFamily="18" charset="0"/>
                               </a:rPr>
-                              <m:t>𝑔</m:t>
+                              <m:t>+</m:t>
                             </m:r>
-                          </m:e>
-                          <m:sub>
-                            <m:sSubSup>
-                              <m:sSubSupPr>
+                            <m:r>
+                              <m:rPr>
+                                <m:sty m:val="p"/>
+                              </m:rPr>
+                              <a:rPr lang="en-US" sz="1100">
+                                <a:latin typeface="Cambria Math" panose="02040503050406030204" pitchFamily="18" charset="0"/>
+                              </a:rPr>
+                              <m:t>Δ</m:t>
+                            </m:r>
+                            <m:sSub>
+                              <m:sSubPr>
                                 <m:ctrlPr>
                                   <a:rPr lang="en-US" sz="1100" i="1">
                                     <a:latin typeface="Cambria Math" panose="02040503050406030204" pitchFamily="18" charset="0"/>
                                   </a:rPr>
                                 </m:ctrlPr>
-                              </m:sSubSupPr>
+                              </m:sSubPr>
                               <m:e>
                                 <m:r>
                                   <a:rPr lang="en-US" sz="1100" i="1">
                                     <a:latin typeface="Cambria Math" panose="02040503050406030204" pitchFamily="18" charset="0"/>
                                   </a:rPr>
-                                  <m:t>𝛽</m:t>
+                                  <m:t>𝑔</m:t>
                                 </m:r>
                               </m:e>
                               <m:sub>
-                                <m:r>
-                                  <a:rPr lang="en-US" sz="1100" i="1">
-                                    <a:latin typeface="Cambria Math" panose="02040503050406030204" pitchFamily="18" charset="0"/>
-                                  </a:rPr>
-                                  <m:t>𝑚𝑜𝑙</m:t>
-                                </m:r>
+                                <m:sSubSup>
+                                  <m:sSubSupPr>
+                                    <m:ctrlPr>
+                                      <a:rPr lang="en-US" sz="1100" i="1">
+                                        <a:latin typeface="Cambria Math" panose="02040503050406030204" pitchFamily="18" charset="0"/>
+                                      </a:rPr>
+                                    </m:ctrlPr>
+                                  </m:sSubSupPr>
+                                  <m:e>
+                                    <m:r>
+                                      <a:rPr lang="en-US" sz="1100" i="1">
+                                        <a:latin typeface="Cambria Math" panose="02040503050406030204" pitchFamily="18" charset="0"/>
+                                      </a:rPr>
+                                      <m:t>𝛽</m:t>
+                                    </m:r>
+                                  </m:e>
+                                  <m:sub>
+                                    <m:r>
+                                      <a:rPr lang="en-US" sz="1100" i="1">
+                                        <a:latin typeface="Cambria Math" panose="02040503050406030204" pitchFamily="18" charset="0"/>
+                                      </a:rPr>
+                                      <m:t>𝑚𝑜𝑙</m:t>
+                                    </m:r>
+                                  </m:sub>
+                                  <m:sup>
+                                    <m:r>
+                                      <a:rPr lang="en-US" sz="1100" i="1">
+                                        <a:latin typeface="Cambria Math" panose="02040503050406030204" pitchFamily="18" charset="0"/>
+                                      </a:rPr>
+                                      <m:t>𝑎𝑡𝑡</m:t>
+                                    </m:r>
+                                  </m:sup>
+                                </m:sSubSup>
                               </m:sub>
-                              <m:sup>
-                                <m:r>
-                                  <a:rPr lang="en-US" sz="1100" i="1">
-                                    <a:latin typeface="Cambria Math" panose="02040503050406030204" pitchFamily="18" charset="0"/>
-                                  </a:rPr>
-                                  <m:t>𝑎𝑡𝑡</m:t>
-                                </m:r>
-                              </m:sup>
-                            </m:sSubSup>
-                          </m:sub>
-                        </m:sSub>
+                            </m:sSub>
+                          </m:e>
+                        </m:d>
                       </m:oMath>
                     </m:oMathPara>
                   </a14:m>
@@ -8265,8 +8290,8 @@
             <a:chExt cx="7398625" cy="354816"/>
           </a:xfrm>
         </p:grpSpPr>
-        <mc:AlternateContent xmlns:mc="http://schemas.openxmlformats.org/markup-compatibility/2006">
-          <mc:Choice xmlns:a14="http://schemas.microsoft.com/office/drawing/2010/main" Requires="a14">
+        <mc:AlternateContent xmlns:mc="http://schemas.openxmlformats.org/markup-compatibility/2006" xmlns:a14="http://schemas.microsoft.com/office/drawing/2010/main">
+          <mc:Choice Requires="a14">
             <p:sp>
               <p:nvSpPr>
                 <p:cNvPr id="12" name="TextBox 4">
@@ -8565,7 +8590,7 @@
               </p:txBody>
             </p:sp>
           </mc:Choice>
-          <mc:Fallback>
+          <mc:Fallback xmlns="">
             <p:sp>
               <p:nvSpPr>
                 <p:cNvPr id="12" name="TextBox 4">
@@ -8680,8 +8705,8 @@
             <a:chExt cx="6947362" cy="664606"/>
           </a:xfrm>
         </p:grpSpPr>
-        <mc:AlternateContent xmlns:mc="http://schemas.openxmlformats.org/markup-compatibility/2006">
-          <mc:Choice xmlns:a14="http://schemas.microsoft.com/office/drawing/2010/main" Requires="a14">
+        <mc:AlternateContent xmlns:mc="http://schemas.openxmlformats.org/markup-compatibility/2006" xmlns:a14="http://schemas.microsoft.com/office/drawing/2010/main">
+          <mc:Choice Requires="a14">
             <p:sp>
               <p:nvSpPr>
                 <p:cNvPr id="13" name="TextBox 5">
@@ -9163,7 +9188,7 @@
               </p:txBody>
             </p:sp>
           </mc:Choice>
-          <mc:Fallback>
+          <mc:Fallback xmlns="">
             <p:sp>
               <p:nvSpPr>
                 <p:cNvPr id="13" name="TextBox 5">
@@ -9327,8 +9352,8 @@
             </a:p>
           </p:txBody>
         </p:sp>
-        <mc:AlternateContent xmlns:mc="http://schemas.openxmlformats.org/markup-compatibility/2006">
-          <mc:Choice xmlns:a14="http://schemas.microsoft.com/office/drawing/2010/main" Requires="a14">
+        <mc:AlternateContent xmlns:mc="http://schemas.openxmlformats.org/markup-compatibility/2006" xmlns:a14="http://schemas.microsoft.com/office/drawing/2010/main">
+          <mc:Choice Requires="a14">
             <p:sp>
               <p:nvSpPr>
                 <p:cNvPr id="19" name="TextBox 11">
@@ -9590,7 +9615,7 @@
               </p:txBody>
             </p:sp>
           </mc:Choice>
-          <mc:Fallback>
+          <mc:Fallback xmlns="">
             <p:sp>
               <p:nvSpPr>
                 <p:cNvPr id="19" name="TextBox 11">

</xml_diff>